<commit_message>
Minor changes to StatsSequenceDiagram and SaveSequenceDiagram
</commit_message>
<xml_diff>
--- a/docs/diagrams/SaveSequenceDiagram.pptx
+++ b/docs/diagrams/SaveSequenceDiagram.pptx
@@ -208,7 +208,7 @@
           <a:p>
             <a:fld id="{F5CC4B3F-88C1-4FFA-B1B6-F41C21DC6924}" type="datetimeFigureOut">
               <a:rPr lang="en-US" smtClean="0"/>
-              <a:t>4/13/2019</a:t>
+              <a:t>4/15/2019</a:t>
             </a:fld>
             <a:endParaRPr lang="en-US"/>
           </a:p>
@@ -519,16 +519,7 @@
           <a:bodyPr/>
           <a:lstStyle/>
           <a:p>
-            <a:r>
-              <a:rPr lang="en-SG" dirty="0"/>
-              <a:t>Add json serializable stats? Or just end</a:t>
-            </a:r>
-          </a:p>
-          <a:p>
-            <a:r>
-              <a:rPr lang="en-SG" dirty="0"/>
-              <a:t>Remove those on  left</a:t>
-            </a:r>
+            <a:endParaRPr lang="en-SG" dirty="0"/>
           </a:p>
         </p:txBody>
       </p:sp>
@@ -747,7 +738,7 @@
           <a:p>
             <a:fld id="{78C97017-6FC3-485B-9764-EAC9E56C1D49}" type="datetimeFigureOut">
               <a:rPr lang="en-US" smtClean="0"/>
-              <a:t>4/13/2019</a:t>
+              <a:t>4/15/2019</a:t>
             </a:fld>
             <a:endParaRPr lang="en-US"/>
           </a:p>
@@ -915,7 +906,7 @@
           <a:p>
             <a:fld id="{78C97017-6FC3-485B-9764-EAC9E56C1D49}" type="datetimeFigureOut">
               <a:rPr lang="en-US" smtClean="0"/>
-              <a:t>4/13/2019</a:t>
+              <a:t>4/15/2019</a:t>
             </a:fld>
             <a:endParaRPr lang="en-US"/>
           </a:p>
@@ -1093,7 +1084,7 @@
           <a:p>
             <a:fld id="{78C97017-6FC3-485B-9764-EAC9E56C1D49}" type="datetimeFigureOut">
               <a:rPr lang="en-US" smtClean="0"/>
-              <a:t>4/13/2019</a:t>
+              <a:t>4/15/2019</a:t>
             </a:fld>
             <a:endParaRPr lang="en-US"/>
           </a:p>
@@ -1261,7 +1252,7 @@
           <a:p>
             <a:fld id="{78C97017-6FC3-485B-9764-EAC9E56C1D49}" type="datetimeFigureOut">
               <a:rPr lang="en-US" smtClean="0"/>
-              <a:t>4/13/2019</a:t>
+              <a:t>4/15/2019</a:t>
             </a:fld>
             <a:endParaRPr lang="en-US"/>
           </a:p>
@@ -1506,7 +1497,7 @@
           <a:p>
             <a:fld id="{78C97017-6FC3-485B-9764-EAC9E56C1D49}" type="datetimeFigureOut">
               <a:rPr lang="en-US" smtClean="0"/>
-              <a:t>4/13/2019</a:t>
+              <a:t>4/15/2019</a:t>
             </a:fld>
             <a:endParaRPr lang="en-US"/>
           </a:p>
@@ -1791,7 +1782,7 @@
           <a:p>
             <a:fld id="{78C97017-6FC3-485B-9764-EAC9E56C1D49}" type="datetimeFigureOut">
               <a:rPr lang="en-US" smtClean="0"/>
-              <a:t>4/13/2019</a:t>
+              <a:t>4/15/2019</a:t>
             </a:fld>
             <a:endParaRPr lang="en-US"/>
           </a:p>
@@ -2210,7 +2201,7 @@
           <a:p>
             <a:fld id="{78C97017-6FC3-485B-9764-EAC9E56C1D49}" type="datetimeFigureOut">
               <a:rPr lang="en-US" smtClean="0"/>
-              <a:t>4/13/2019</a:t>
+              <a:t>4/15/2019</a:t>
             </a:fld>
             <a:endParaRPr lang="en-US"/>
           </a:p>
@@ -2327,7 +2318,7 @@
           <a:p>
             <a:fld id="{78C97017-6FC3-485B-9764-EAC9E56C1D49}" type="datetimeFigureOut">
               <a:rPr lang="en-US" smtClean="0"/>
-              <a:t>4/13/2019</a:t>
+              <a:t>4/15/2019</a:t>
             </a:fld>
             <a:endParaRPr lang="en-US"/>
           </a:p>
@@ -2422,7 +2413,7 @@
           <a:p>
             <a:fld id="{78C97017-6FC3-485B-9764-EAC9E56C1D49}" type="datetimeFigureOut">
               <a:rPr lang="en-US" smtClean="0"/>
-              <a:t>4/13/2019</a:t>
+              <a:t>4/15/2019</a:t>
             </a:fld>
             <a:endParaRPr lang="en-US"/>
           </a:p>
@@ -2697,7 +2688,7 @@
           <a:p>
             <a:fld id="{78C97017-6FC3-485B-9764-EAC9E56C1D49}" type="datetimeFigureOut">
               <a:rPr lang="en-US" smtClean="0"/>
-              <a:t>4/13/2019</a:t>
+              <a:t>4/15/2019</a:t>
             </a:fld>
             <a:endParaRPr lang="en-US"/>
           </a:p>
@@ -2949,7 +2940,7 @@
           <a:p>
             <a:fld id="{78C97017-6FC3-485B-9764-EAC9E56C1D49}" type="datetimeFigureOut">
               <a:rPr lang="en-US" smtClean="0"/>
-              <a:t>4/13/2019</a:t>
+              <a:t>4/15/2019</a:t>
             </a:fld>
             <a:endParaRPr lang="en-US"/>
           </a:p>
@@ -3160,7 +3151,7 @@
           <a:p>
             <a:fld id="{78C97017-6FC3-485B-9764-EAC9E56C1D49}" type="datetimeFigureOut">
               <a:rPr lang="en-US" smtClean="0"/>
-              <a:t>4/13/2019</a:t>
+              <a:t>4/15/2019</a:t>
             </a:fld>
             <a:endParaRPr lang="en-US"/>
           </a:p>
@@ -3549,7 +3540,7 @@
         </p:nvSpPr>
         <p:spPr>
           <a:xfrm>
-            <a:off x="10317621" y="170813"/>
+            <a:off x="8294985" y="94614"/>
             <a:ext cx="4182854" cy="6582967"/>
           </a:xfrm>
           <a:prstGeom prst="roundRect">
@@ -3558,9 +3549,9 @@
             </a:avLst>
           </a:prstGeom>
           <a:solidFill>
-            <a:schemeClr val="accent3">
-              <a:lumMod val="20000"/>
-              <a:lumOff val="80000"/>
+            <a:schemeClr val="accent6">
+              <a:lumMod val="40000"/>
+              <a:lumOff val="60000"/>
             </a:schemeClr>
           </a:solidFill>
           <a:ln w="19050">
@@ -3589,38 +3580,14 @@
             <a:r>
               <a:rPr lang="en-US" sz="1200" b="1" dirty="0">
                 <a:solidFill>
-                  <a:schemeClr val="accent3">
-                    <a:lumMod val="50000"/>
-                  </a:schemeClr>
+                  <a:schemeClr val="tx1"/>
                 </a:solidFill>
               </a:rPr>
-              <a:t>Storage (change </a:t>
-            </a:r>
-            <a:r>
-              <a:rPr lang="en-US" sz="1200" b="1" dirty="0" err="1">
-                <a:solidFill>
-                  <a:schemeClr val="accent3">
-                    <a:lumMod val="50000"/>
-                  </a:schemeClr>
-                </a:solidFill>
-              </a:rPr>
-              <a:t>colour</a:t>
-            </a:r>
-            <a:r>
-              <a:rPr lang="en-US" sz="1200" b="1" dirty="0">
-                <a:solidFill>
-                  <a:schemeClr val="accent3">
-                    <a:lumMod val="50000"/>
-                  </a:schemeClr>
-                </a:solidFill>
-              </a:rPr>
-              <a:t>)</a:t>
+              <a:t>Storage</a:t>
             </a:r>
             <a:endParaRPr lang="en-SG" sz="1200" b="1" dirty="0">
               <a:solidFill>
-                <a:schemeClr val="accent3">
-                  <a:lumMod val="50000"/>
-                </a:schemeClr>
+                <a:schemeClr val="tx1"/>
               </a:solidFill>
             </a:endParaRPr>
           </a:p>
@@ -3634,7 +3601,7 @@
         </p:nvSpPr>
         <p:spPr>
           <a:xfrm>
-            <a:off x="8525426" y="145258"/>
+            <a:off x="6543194" y="83034"/>
             <a:ext cx="1710363" cy="6649559"/>
           </a:xfrm>
           <a:prstGeom prst="roundRect">
@@ -3695,7 +3662,7 @@
         </p:nvSpPr>
         <p:spPr>
           <a:xfrm>
-            <a:off x="4253752" y="145258"/>
+            <a:off x="2231116" y="69059"/>
             <a:ext cx="4258586" cy="6649559"/>
           </a:xfrm>
           <a:prstGeom prst="roundRect">
@@ -3758,7 +3725,7 @@
         </p:nvCxnSpPr>
         <p:spPr>
           <a:xfrm flipH="1">
-            <a:off x="6356376" y="1674002"/>
+            <a:off x="4333740" y="1597803"/>
             <a:ext cx="1002" cy="1389502"/>
           </a:xfrm>
           <a:prstGeom prst="line">
@@ -3795,7 +3762,7 @@
         </p:nvSpPr>
         <p:spPr>
           <a:xfrm>
-            <a:off x="6290634" y="1668091"/>
+            <a:off x="4267998" y="1591892"/>
             <a:ext cx="138706" cy="357144"/>
           </a:xfrm>
           <a:prstGeom prst="rect">
@@ -3844,7 +3811,7 @@
         </p:nvCxnSpPr>
         <p:spPr>
           <a:xfrm flipV="1">
-            <a:off x="4016248" y="1520174"/>
+            <a:off x="1993612" y="1443975"/>
             <a:ext cx="1525045" cy="959"/>
           </a:xfrm>
           <a:prstGeom prst="straightConnector1">
@@ -3880,7 +3847,7 @@
         </p:nvSpPr>
         <p:spPr>
           <a:xfrm>
-            <a:off x="4518188" y="2697782"/>
+            <a:off x="2495552" y="2621583"/>
             <a:ext cx="855808" cy="215444"/>
           </a:xfrm>
           <a:prstGeom prst="rect">
@@ -3922,7 +3889,7 @@
         </p:nvCxnSpPr>
         <p:spPr>
           <a:xfrm>
-            <a:off x="3987215" y="2008707"/>
+            <a:off x="1964579" y="1932508"/>
             <a:ext cx="2277636" cy="0"/>
           </a:xfrm>
           <a:prstGeom prst="straightConnector1">
@@ -3960,18 +3927,22 @@
         </p:nvSpPr>
         <p:spPr>
           <a:xfrm>
-            <a:off x="10327828" y="1357205"/>
+            <a:off x="8410545" y="1279989"/>
             <a:ext cx="1974798" cy="351227"/>
           </a:xfrm>
           <a:prstGeom prst="rect">
             <a:avLst/>
           </a:prstGeom>
           <a:solidFill>
-            <a:srgbClr val="92D050"/>
+            <a:schemeClr val="accent6">
+              <a:lumMod val="75000"/>
+            </a:schemeClr>
           </a:solidFill>
           <a:ln w="19050">
             <a:solidFill>
-              <a:srgbClr val="92D050"/>
+              <a:schemeClr val="accent6">
+                <a:lumMod val="75000"/>
+              </a:schemeClr>
             </a:solidFill>
           </a:ln>
           <a:effectLst/>
@@ -4019,7 +3990,7 @@
         </p:nvSpPr>
         <p:spPr>
           <a:xfrm>
-            <a:off x="8642823" y="2505324"/>
+            <a:off x="6620187" y="2429125"/>
             <a:ext cx="1532257" cy="269018"/>
           </a:xfrm>
           <a:prstGeom prst="rect">
@@ -4080,7 +4051,7 @@
         </p:nvCxnSpPr>
         <p:spPr>
           <a:xfrm flipH="1">
-            <a:off x="9398415" y="2713286"/>
+            <a:off x="7375779" y="2637087"/>
             <a:ext cx="9028" cy="4373314"/>
           </a:xfrm>
           <a:prstGeom prst="line">
@@ -4117,7 +4088,7 @@
         </p:nvSpPr>
         <p:spPr>
           <a:xfrm>
-            <a:off x="9344038" y="3276600"/>
+            <a:off x="7321402" y="3200401"/>
             <a:ext cx="179136" cy="414827"/>
           </a:xfrm>
           <a:prstGeom prst="rect">
@@ -4166,7 +4137,7 @@
         </p:nvCxnSpPr>
         <p:spPr>
           <a:xfrm>
-            <a:off x="6441281" y="3276599"/>
+            <a:off x="4418645" y="3200400"/>
             <a:ext cx="2937036" cy="10820"/>
           </a:xfrm>
           <a:prstGeom prst="straightConnector1">
@@ -4202,7 +4173,7 @@
         </p:nvSpPr>
         <p:spPr>
           <a:xfrm>
-            <a:off x="5552884" y="1316853"/>
+            <a:off x="3530248" y="1240654"/>
             <a:ext cx="1650371" cy="357143"/>
           </a:xfrm>
           <a:prstGeom prst="rect">
@@ -4243,15 +4214,7 @@
                   <a:schemeClr val="bg1"/>
                 </a:solidFill>
               </a:rPr>
-              <a:t>:</a:t>
-            </a:r>
-            <a:r>
-              <a:rPr lang="en-US" sz="1600" dirty="0" err="1">
-                <a:solidFill>
-                  <a:schemeClr val="bg1"/>
-                </a:solidFill>
-              </a:rPr>
-              <a:t>SaveCommand</a:t>
+              <a:t>:SaveCommand</a:t>
             </a:r>
             <a:endParaRPr lang="en-SG" sz="1600" dirty="0">
               <a:solidFill>
@@ -4277,8 +4240,8 @@
         </p:nvCxnSpPr>
         <p:spPr>
           <a:xfrm>
-            <a:off x="1672518" y="2890740"/>
-            <a:ext cx="4607442" cy="0"/>
+            <a:off x="1993612" y="2814540"/>
+            <a:ext cx="2263712" cy="1"/>
           </a:xfrm>
           <a:prstGeom prst="straightConnector1">
             <a:avLst/>
@@ -4321,7 +4284,7 @@
         </p:nvCxnSpPr>
         <p:spPr>
           <a:xfrm>
-            <a:off x="6469487" y="6321781"/>
+            <a:off x="4446851" y="6245582"/>
             <a:ext cx="1236429" cy="0"/>
           </a:xfrm>
           <a:prstGeom prst="straightConnector1">
@@ -4367,7 +4330,7 @@
         </p:nvCxnSpPr>
         <p:spPr>
           <a:xfrm>
-            <a:off x="11110540" y="1707415"/>
+            <a:off x="9108281" y="1631216"/>
             <a:ext cx="0" cy="5781486"/>
           </a:xfrm>
           <a:prstGeom prst="line">
@@ -4375,7 +4338,9 @@
           </a:prstGeom>
           <a:ln w="19050">
             <a:solidFill>
-              <a:srgbClr val="00B050"/>
+              <a:schemeClr val="accent6">
+                <a:lumMod val="75000"/>
+              </a:schemeClr>
             </a:solidFill>
             <a:prstDash val="sysDash"/>
           </a:ln>
@@ -4404,7 +4369,7 @@
         </p:nvSpPr>
         <p:spPr>
           <a:xfrm>
-            <a:off x="13091730" y="4350245"/>
+            <a:off x="11069094" y="4274046"/>
             <a:ext cx="1319810" cy="184666"/>
           </a:xfrm>
           <a:prstGeom prst="rect">
@@ -4436,8 +4401,8 @@
             <a:r>
               <a:rPr lang="en-US" sz="1200" dirty="0">
                 <a:solidFill>
-                  <a:schemeClr val="accent3">
-                    <a:lumMod val="50000"/>
+                  <a:schemeClr val="accent6">
+                    <a:lumMod val="75000"/>
                   </a:schemeClr>
                 </a:solidFill>
               </a:rPr>
@@ -4454,7 +4419,7 @@
         </p:nvSpPr>
         <p:spPr>
           <a:xfrm>
-            <a:off x="6267047" y="2890739"/>
+            <a:off x="4244411" y="2814540"/>
             <a:ext cx="193342" cy="3584051"/>
           </a:xfrm>
           <a:prstGeom prst="rect">
@@ -4507,7 +4472,7 @@
         </p:nvSpPr>
         <p:spPr>
           <a:xfrm>
-            <a:off x="6211085" y="6492298"/>
+            <a:off x="4188449" y="6416099"/>
             <a:ext cx="258402" cy="261482"/>
           </a:xfrm>
           <a:prstGeom prst="rect">
@@ -4546,7 +4511,7 @@
         </p:nvSpPr>
         <p:spPr>
           <a:xfrm>
-            <a:off x="6893169" y="3017243"/>
+            <a:off x="4870533" y="2941044"/>
             <a:ext cx="1541418" cy="215444"/>
           </a:xfrm>
           <a:prstGeom prst="rect">
@@ -4594,7 +4559,7 @@
         </p:nvCxnSpPr>
         <p:spPr>
           <a:xfrm>
-            <a:off x="6429340" y="4915773"/>
+            <a:off x="4406704" y="4839574"/>
             <a:ext cx="2872148" cy="0"/>
           </a:xfrm>
           <a:prstGeom prst="straightConnector1">
@@ -4640,7 +4605,7 @@
         </p:nvCxnSpPr>
         <p:spPr>
           <a:xfrm>
-            <a:off x="6440015" y="3693907"/>
+            <a:off x="4417379" y="3617708"/>
             <a:ext cx="2960448" cy="1"/>
           </a:xfrm>
           <a:prstGeom prst="straightConnector1">
@@ -4684,7 +4649,7 @@
         </p:nvGrpSpPr>
         <p:grpSpPr>
           <a:xfrm>
-            <a:off x="6340118" y="5603229"/>
+            <a:off x="4317482" y="5527030"/>
             <a:ext cx="2098168" cy="1045533"/>
             <a:chOff x="13876547" y="5116008"/>
             <a:chExt cx="2098168" cy="1045533"/>
@@ -4870,7 +4835,7 @@
         </p:nvCxnSpPr>
         <p:spPr>
           <a:xfrm>
-            <a:off x="6429340" y="5939802"/>
+            <a:off x="4406704" y="5863603"/>
             <a:ext cx="389487" cy="0"/>
           </a:xfrm>
           <a:prstGeom prst="straightConnector1">
@@ -4913,9 +4878,9 @@
           <p:nvPr/>
         </p:nvCxnSpPr>
         <p:spPr>
-          <a:xfrm>
-            <a:off x="1793081" y="6467988"/>
-            <a:ext cx="4534710" cy="6802"/>
+          <a:xfrm flipV="1">
+            <a:off x="1972592" y="6398591"/>
+            <a:ext cx="2332563" cy="5353"/>
           </a:xfrm>
           <a:prstGeom prst="straightConnector1">
             <a:avLst/>
@@ -4960,7 +4925,7 @@
         </p:nvCxnSpPr>
         <p:spPr>
           <a:xfrm>
-            <a:off x="6400876" y="3969256"/>
+            <a:off x="4378240" y="3893057"/>
             <a:ext cx="2933075" cy="0"/>
           </a:xfrm>
           <a:prstGeom prst="straightConnector1">
@@ -5002,7 +4967,7 @@
         </p:nvSpPr>
         <p:spPr>
           <a:xfrm>
-            <a:off x="6912513" y="3746956"/>
+            <a:off x="4889877" y="3670757"/>
             <a:ext cx="1541418" cy="215444"/>
           </a:xfrm>
           <a:prstGeom prst="rect">
@@ -5048,7 +5013,7 @@
         </p:nvSpPr>
         <p:spPr>
           <a:xfrm>
-            <a:off x="9325176" y="3969256"/>
+            <a:off x="7302540" y="3893057"/>
             <a:ext cx="194756" cy="1035146"/>
           </a:xfrm>
           <a:prstGeom prst="rect">
@@ -5101,18 +5066,22 @@
         </p:nvSpPr>
         <p:spPr>
           <a:xfrm>
-            <a:off x="11004068" y="4124442"/>
+            <a:off x="8981432" y="4048243"/>
             <a:ext cx="212945" cy="731825"/>
           </a:xfrm>
           <a:prstGeom prst="rect">
             <a:avLst/>
           </a:prstGeom>
           <a:solidFill>
-            <a:srgbClr val="92D050"/>
+            <a:schemeClr val="accent6">
+              <a:lumMod val="75000"/>
+            </a:schemeClr>
           </a:solidFill>
           <a:ln>
             <a:solidFill>
-              <a:srgbClr val="92D050"/>
+              <a:schemeClr val="accent6">
+                <a:lumMod val="75000"/>
+              </a:schemeClr>
             </a:solidFill>
           </a:ln>
           <a:effectLst/>
@@ -5154,7 +5123,7 @@
         </p:nvSpPr>
         <p:spPr>
           <a:xfrm>
-            <a:off x="3530239" y="1330919"/>
+            <a:off x="1511945" y="1172267"/>
             <a:ext cx="1899551" cy="215444"/>
           </a:xfrm>
           <a:prstGeom prst="rect">
@@ -5202,7 +5171,7 @@
         </p:nvCxnSpPr>
         <p:spPr>
           <a:xfrm>
-            <a:off x="12859765" y="4232522"/>
+            <a:off x="10837129" y="4156323"/>
             <a:ext cx="72937" cy="109922"/>
           </a:xfrm>
           <a:prstGeom prst="curvedConnector3">
@@ -5212,8 +5181,8 @@
           </a:prstGeom>
           <a:ln>
             <a:solidFill>
-              <a:schemeClr val="accent3">
-                <a:lumMod val="50000"/>
+              <a:schemeClr val="accent6">
+                <a:lumMod val="75000"/>
               </a:schemeClr>
             </a:solidFill>
             <a:tailEnd type="triangle"/>
@@ -5250,7 +5219,7 @@
         </p:nvCxnSpPr>
         <p:spPr>
           <a:xfrm flipH="1">
-            <a:off x="12861189" y="4523535"/>
+            <a:off x="10838553" y="4447336"/>
             <a:ext cx="80994" cy="147447"/>
           </a:xfrm>
           <a:prstGeom prst="curvedConnector3">
@@ -5260,7 +5229,9 @@
           </a:prstGeom>
           <a:ln>
             <a:solidFill>
-              <a:srgbClr val="7030A0"/>
+              <a:schemeClr val="accent6">
+                <a:lumMod val="75000"/>
+              </a:schemeClr>
             </a:solidFill>
             <a:prstDash val="sysDash"/>
             <a:tailEnd type="triangle"/>
@@ -5297,7 +5268,7 @@
         </p:nvCxnSpPr>
         <p:spPr>
           <a:xfrm>
-            <a:off x="9519932" y="4124442"/>
+            <a:off x="7497296" y="4048243"/>
             <a:ext cx="1491290" cy="8937"/>
           </a:xfrm>
           <a:prstGeom prst="straightConnector1">
@@ -5305,7 +5276,9 @@
           </a:prstGeom>
           <a:ln w="19050">
             <a:solidFill>
-              <a:srgbClr val="0070C0"/>
+              <a:schemeClr val="accent6">
+                <a:lumMod val="75000"/>
+              </a:schemeClr>
             </a:solidFill>
             <a:tailEnd type="arrow"/>
           </a:ln>
@@ -5339,7 +5312,7 @@
         </p:nvSpPr>
         <p:spPr>
           <a:xfrm>
-            <a:off x="9243344" y="3885546"/>
+            <a:off x="7220708" y="3809347"/>
             <a:ext cx="1561239" cy="215444"/>
           </a:xfrm>
           <a:prstGeom prst="rect">
@@ -5365,7 +5338,13 @@
           </a:lstStyle>
           <a:p>
             <a:r>
-              <a:rPr lang="en-US" dirty="0"/>
+              <a:rPr lang="en-US" dirty="0">
+                <a:solidFill>
+                  <a:schemeClr val="accent6">
+                    <a:lumMod val="75000"/>
+                  </a:schemeClr>
+                </a:solidFill>
+              </a:rPr>
               <a:t>saveStatistics()</a:t>
             </a:r>
           </a:p>
@@ -5387,7 +5366,7 @@
         </p:nvCxnSpPr>
         <p:spPr>
           <a:xfrm>
-            <a:off x="11217013" y="4241065"/>
+            <a:off x="9194377" y="4164866"/>
             <a:ext cx="1437555" cy="0"/>
           </a:xfrm>
           <a:prstGeom prst="straightConnector1">
@@ -5395,7 +5374,9 @@
           </a:prstGeom>
           <a:ln w="19050">
             <a:solidFill>
-              <a:srgbClr val="0070C0"/>
+              <a:schemeClr val="accent6">
+                <a:lumMod val="75000"/>
+              </a:schemeClr>
             </a:solidFill>
             <a:tailEnd type="arrow"/>
           </a:ln>
@@ -5429,7 +5410,7 @@
         </p:nvSpPr>
         <p:spPr>
           <a:xfrm>
-            <a:off x="11188124" y="3882448"/>
+            <a:off x="9146521" y="3808034"/>
             <a:ext cx="1588424" cy="215444"/>
           </a:xfrm>
           <a:prstGeom prst="rect">
@@ -5455,7 +5436,13 @@
           </a:lstStyle>
           <a:p>
             <a:r>
-              <a:rPr lang="en-US" dirty="0"/>
+              <a:rPr lang="en-US" dirty="0">
+                <a:solidFill>
+                  <a:schemeClr val="accent6">
+                    <a:lumMod val="75000"/>
+                  </a:schemeClr>
+                </a:solidFill>
+              </a:rPr>
               <a:t>getStatisticsFilePath()</a:t>
             </a:r>
           </a:p>
@@ -5475,18 +5462,22 @@
         </p:nvSpPr>
         <p:spPr>
           <a:xfrm>
-            <a:off x="11896854" y="2407097"/>
+            <a:off x="9874218" y="2330898"/>
             <a:ext cx="1974798" cy="351227"/>
           </a:xfrm>
           <a:prstGeom prst="rect">
             <a:avLst/>
           </a:prstGeom>
           <a:solidFill>
-            <a:srgbClr val="92D050"/>
+            <a:schemeClr val="accent6">
+              <a:lumMod val="75000"/>
+            </a:schemeClr>
           </a:solidFill>
           <a:ln w="19050">
             <a:solidFill>
-              <a:srgbClr val="92D050"/>
+              <a:schemeClr val="accent6">
+                <a:lumMod val="75000"/>
+              </a:schemeClr>
             </a:solidFill>
           </a:ln>
           <a:effectLst/>
@@ -5542,7 +5533,7 @@
         </p:nvCxnSpPr>
         <p:spPr>
           <a:xfrm>
-            <a:off x="11217013" y="4661166"/>
+            <a:off x="9194377" y="4584967"/>
             <a:ext cx="1492713" cy="19633"/>
           </a:xfrm>
           <a:prstGeom prst="straightConnector1">
@@ -5550,7 +5541,9 @@
           </a:prstGeom>
           <a:ln w="19050">
             <a:solidFill>
-              <a:srgbClr val="7030A0"/>
+              <a:schemeClr val="accent6">
+                <a:lumMod val="75000"/>
+              </a:schemeClr>
             </a:solidFill>
             <a:prstDash val="sysDash"/>
             <a:headEnd type="arrow" w="med" len="med"/>
@@ -5588,7 +5581,7 @@
         </p:nvCxnSpPr>
         <p:spPr>
           <a:xfrm flipH="1">
-            <a:off x="12761040" y="2805504"/>
+            <a:off x="10708481" y="2667000"/>
             <a:ext cx="15508" cy="5403353"/>
           </a:xfrm>
           <a:prstGeom prst="line">
@@ -5596,7 +5589,9 @@
           </a:prstGeom>
           <a:ln w="19050">
             <a:solidFill>
-              <a:srgbClr val="00B050"/>
+              <a:schemeClr val="accent6">
+                <a:lumMod val="75000"/>
+              </a:schemeClr>
             </a:solidFill>
             <a:prstDash val="sysDash"/>
           </a:ln>
@@ -5633,7 +5628,7 @@
         </p:nvCxnSpPr>
         <p:spPr>
           <a:xfrm>
-            <a:off x="9490298" y="4842446"/>
+            <a:off x="7467662" y="4766247"/>
             <a:ext cx="1492713" cy="19633"/>
           </a:xfrm>
           <a:prstGeom prst="straightConnector1">
@@ -5641,7 +5636,9 @@
           </a:prstGeom>
           <a:ln w="19050">
             <a:solidFill>
-              <a:srgbClr val="7030A0"/>
+              <a:schemeClr val="accent6">
+                <a:lumMod val="75000"/>
+              </a:schemeClr>
             </a:solidFill>
             <a:prstDash val="sysDash"/>
             <a:headEnd type="arrow" w="med" len="med"/>
@@ -5677,18 +5674,22 @@
         </p:nvSpPr>
         <p:spPr>
           <a:xfrm>
-            <a:off x="12643293" y="4232522"/>
+            <a:off x="10620657" y="4156323"/>
             <a:ext cx="212945" cy="491651"/>
           </a:xfrm>
           <a:prstGeom prst="rect">
             <a:avLst/>
           </a:prstGeom>
           <a:solidFill>
-            <a:srgbClr val="92D050"/>
+            <a:schemeClr val="accent6">
+              <a:lumMod val="75000"/>
+            </a:schemeClr>
           </a:solidFill>
           <a:ln>
             <a:solidFill>
-              <a:srgbClr val="92D050"/>
+              <a:schemeClr val="accent6">
+                <a:lumMod val="75000"/>
+              </a:schemeClr>
             </a:solidFill>
           </a:ln>
           <a:effectLst/>
@@ -5730,18 +5731,22 @@
         </p:nvSpPr>
         <p:spPr>
           <a:xfrm>
-            <a:off x="12867512" y="4319424"/>
+            <a:off x="10844876" y="4243225"/>
             <a:ext cx="85940" cy="211170"/>
           </a:xfrm>
           <a:prstGeom prst="rect">
             <a:avLst/>
           </a:prstGeom>
           <a:solidFill>
-            <a:srgbClr val="92D050"/>
+            <a:schemeClr val="accent6">
+              <a:lumMod val="75000"/>
+            </a:schemeClr>
           </a:solidFill>
           <a:ln>
             <a:solidFill>
-              <a:srgbClr val="92D050"/>
+              <a:schemeClr val="accent6">
+                <a:lumMod val="75000"/>
+              </a:schemeClr>
             </a:solidFill>
           </a:ln>
           <a:effectLst/>

</xml_diff>

<commit_message>
Fixed typo in SaveSequenceDiagram
</commit_message>
<xml_diff>
--- a/docs/diagrams/SaveSequenceDiagram.pptx
+++ b/docs/diagrams/SaveSequenceDiagram.pptx
@@ -5149,8 +5149,12 @@
           </a:lstStyle>
           <a:p>
             <a:r>
+              <a:rPr lang="en-US" dirty="0" err="1"/>
+              <a:t>saveCommand</a:t>
+            </a:r>
+            <a:r>
               <a:rPr lang="en-US" dirty="0"/>
-              <a:t>statsCommand()</a:t>
+              <a:t>()</a:t>
             </a:r>
           </a:p>
         </p:txBody>

</xml_diff>

<commit_message>
Add ReadSequenceDiagram and introduced compareData method
</commit_message>
<xml_diff>
--- a/docs/diagrams/SaveSequenceDiagram.pptx
+++ b/docs/diagrams/SaveSequenceDiagram.pptx
@@ -3656,271 +3656,6 @@
       </p:sp>
       <p:sp>
         <p:nvSpPr>
-          <p:cNvPr id="81" name="Rectangle 65"/>
-          <p:cNvSpPr/>
-          <p:nvPr/>
-        </p:nvSpPr>
-        <p:spPr>
-          <a:xfrm>
-            <a:off x="2231116" y="69059"/>
-            <a:ext cx="4258586" cy="6649559"/>
-          </a:xfrm>
-          <a:prstGeom prst="roundRect">
-            <a:avLst>
-              <a:gd name="adj" fmla="val 3484"/>
-            </a:avLst>
-          </a:prstGeom>
-          <a:solidFill>
-            <a:schemeClr val="accent1">
-              <a:lumMod val="20000"/>
-              <a:lumOff val="80000"/>
-            </a:schemeClr>
-          </a:solidFill>
-          <a:ln w="19050">
-            <a:noFill/>
-          </a:ln>
-          <a:effectLst/>
-        </p:spPr>
-        <p:style>
-          <a:lnRef idx="1">
-            <a:schemeClr val="accent2"/>
-          </a:lnRef>
-          <a:fillRef idx="2">
-            <a:schemeClr val="accent2"/>
-          </a:fillRef>
-          <a:effectRef idx="1">
-            <a:schemeClr val="accent2"/>
-          </a:effectRef>
-          <a:fontRef idx="minor">
-            <a:schemeClr val="dk1"/>
-          </a:fontRef>
-        </p:style>
-        <p:txBody>
-          <a:bodyPr rtlCol="0" anchor="t"/>
-          <a:lstStyle/>
-          <a:p>
-            <a:r>
-              <a:rPr lang="en-US" sz="1200" b="1" dirty="0">
-                <a:solidFill>
-                  <a:srgbClr val="0070C0"/>
-                </a:solidFill>
-              </a:rPr>
-              <a:t>Logic</a:t>
-            </a:r>
-            <a:endParaRPr lang="en-SG" sz="1200" b="1" dirty="0">
-              <a:solidFill>
-                <a:srgbClr val="0070C0"/>
-              </a:solidFill>
-            </a:endParaRPr>
-          </a:p>
-        </p:txBody>
-      </p:sp>
-      <p:cxnSp>
-        <p:nvCxnSpPr>
-          <p:cNvPr id="20" name="Straight Connector 19"/>
-          <p:cNvCxnSpPr>
-            <a:cxnSpLocks/>
-          </p:cNvCxnSpPr>
-          <p:nvPr/>
-        </p:nvCxnSpPr>
-        <p:spPr>
-          <a:xfrm flipH="1">
-            <a:off x="4333740" y="1597803"/>
-            <a:ext cx="1002" cy="1389502"/>
-          </a:xfrm>
-          <a:prstGeom prst="line">
-            <a:avLst/>
-          </a:prstGeom>
-          <a:ln w="19050">
-            <a:solidFill>
-              <a:srgbClr val="0070C0"/>
-            </a:solidFill>
-            <a:prstDash val="sysDash"/>
-          </a:ln>
-          <a:effectLst/>
-        </p:spPr>
-        <p:style>
-          <a:lnRef idx="1">
-            <a:schemeClr val="accent1"/>
-          </a:lnRef>
-          <a:fillRef idx="2">
-            <a:schemeClr val="accent1"/>
-          </a:fillRef>
-          <a:effectRef idx="1">
-            <a:schemeClr val="accent1"/>
-          </a:effectRef>
-          <a:fontRef idx="minor">
-            <a:schemeClr val="dk1"/>
-          </a:fontRef>
-        </p:style>
-      </p:cxnSp>
-      <p:sp>
-        <p:nvSpPr>
-          <p:cNvPr id="21" name="Rectangle 20"/>
-          <p:cNvSpPr/>
-          <p:nvPr/>
-        </p:nvSpPr>
-        <p:spPr>
-          <a:xfrm>
-            <a:off x="4267998" y="1591892"/>
-            <a:ext cx="138706" cy="357144"/>
-          </a:xfrm>
-          <a:prstGeom prst="rect">
-            <a:avLst/>
-          </a:prstGeom>
-          <a:solidFill>
-            <a:srgbClr val="0070C0"/>
-          </a:solidFill>
-          <a:ln>
-            <a:solidFill>
-              <a:srgbClr val="0070C0"/>
-            </a:solidFill>
-          </a:ln>
-          <a:effectLst/>
-        </p:spPr>
-        <p:style>
-          <a:lnRef idx="1">
-            <a:schemeClr val="accent3"/>
-          </a:lnRef>
-          <a:fillRef idx="2">
-            <a:schemeClr val="accent3"/>
-          </a:fillRef>
-          <a:effectRef idx="1">
-            <a:schemeClr val="accent3"/>
-          </a:effectRef>
-          <a:fontRef idx="minor">
-            <a:schemeClr val="dk1"/>
-          </a:fontRef>
-        </p:style>
-        <p:txBody>
-          <a:bodyPr rtlCol="0" anchor="ctr"/>
-          <a:lstStyle/>
-          <a:p>
-            <a:pPr algn="ctr"/>
-            <a:endParaRPr lang="en-SG" sz="1400"/>
-          </a:p>
-        </p:txBody>
-      </p:sp>
-      <p:cxnSp>
-        <p:nvCxnSpPr>
-          <p:cNvPr id="28" name="Straight Arrow Connector 27"/>
-          <p:cNvCxnSpPr>
-            <a:cxnSpLocks/>
-          </p:cNvCxnSpPr>
-          <p:nvPr/>
-        </p:nvCxnSpPr>
-        <p:spPr>
-          <a:xfrm flipV="1">
-            <a:off x="1993612" y="1443975"/>
-            <a:ext cx="1525045" cy="959"/>
-          </a:xfrm>
-          <a:prstGeom prst="straightConnector1">
-            <a:avLst/>
-          </a:prstGeom>
-          <a:ln w="19050">
-            <a:solidFill>
-              <a:srgbClr val="0070C0"/>
-            </a:solidFill>
-            <a:tailEnd type="arrow"/>
-          </a:ln>
-        </p:spPr>
-        <p:style>
-          <a:lnRef idx="1">
-            <a:schemeClr val="accent1"/>
-          </a:lnRef>
-          <a:fillRef idx="0">
-            <a:schemeClr val="accent1"/>
-          </a:fillRef>
-          <a:effectRef idx="0">
-            <a:schemeClr val="accent1"/>
-          </a:effectRef>
-          <a:fontRef idx="minor">
-            <a:schemeClr val="tx1"/>
-          </a:fontRef>
-        </p:style>
-      </p:cxnSp>
-      <p:sp>
-        <p:nvSpPr>
-          <p:cNvPr id="29" name="TextBox 28"/>
-          <p:cNvSpPr txBox="1"/>
-          <p:nvPr/>
-        </p:nvSpPr>
-        <p:spPr>
-          <a:xfrm>
-            <a:off x="2495552" y="2621583"/>
-            <a:ext cx="855808" cy="215444"/>
-          </a:xfrm>
-          <a:prstGeom prst="rect">
-            <a:avLst/>
-          </a:prstGeom>
-          <a:noFill/>
-        </p:spPr>
-        <p:txBody>
-          <a:bodyPr wrap="square" lIns="0" tIns="0" rIns="0" bIns="0" rtlCol="0">
-            <a:spAutoFit/>
-          </a:bodyPr>
-          <a:lstStyle>
-            <a:defPPr>
-              <a:defRPr lang="en-US"/>
-            </a:defPPr>
-            <a:lvl1pPr algn="r">
-              <a:defRPr sz="1400">
-                <a:solidFill>
-                  <a:srgbClr val="0070C0"/>
-                </a:solidFill>
-              </a:defRPr>
-            </a:lvl1pPr>
-          </a:lstStyle>
-          <a:p>
-            <a:r>
-              <a:rPr lang="en-US" dirty="0"/>
-              <a:t>execute()</a:t>
-            </a:r>
-          </a:p>
-        </p:txBody>
-      </p:sp>
-      <p:cxnSp>
-        <p:nvCxnSpPr>
-          <p:cNvPr id="34" name="Straight Arrow Connector 33"/>
-          <p:cNvCxnSpPr>
-            <a:cxnSpLocks/>
-          </p:cNvCxnSpPr>
-          <p:nvPr/>
-        </p:nvCxnSpPr>
-        <p:spPr>
-          <a:xfrm>
-            <a:off x="1964579" y="1932508"/>
-            <a:ext cx="2277636" cy="0"/>
-          </a:xfrm>
-          <a:prstGeom prst="straightConnector1">
-            <a:avLst/>
-          </a:prstGeom>
-          <a:ln w="19050">
-            <a:solidFill>
-              <a:srgbClr val="0070C0"/>
-            </a:solidFill>
-            <a:prstDash val="sysDash"/>
-            <a:headEnd type="arrow" w="med" len="med"/>
-            <a:tailEnd type="none" w="med" len="med"/>
-          </a:ln>
-        </p:spPr>
-        <p:style>
-          <a:lnRef idx="1">
-            <a:schemeClr val="accent1"/>
-          </a:lnRef>
-          <a:fillRef idx="0">
-            <a:schemeClr val="accent1"/>
-          </a:fillRef>
-          <a:effectRef idx="0">
-            <a:schemeClr val="accent1"/>
-          </a:effectRef>
-          <a:fontRef idx="minor">
-            <a:schemeClr val="tx1"/>
-          </a:fontRef>
-        </p:style>
-      </p:cxnSp>
-      <p:sp>
-        <p:nvSpPr>
           <p:cNvPr id="84" name="Rectangle 62"/>
           <p:cNvSpPr/>
           <p:nvPr/>
@@ -4137,8 +3872,8 @@
         </p:nvCxnSpPr>
         <p:spPr>
           <a:xfrm>
-            <a:off x="4418645" y="3200400"/>
-            <a:ext cx="2937036" cy="10820"/>
+            <a:off x="4417379" y="3211220"/>
+            <a:ext cx="2938302" cy="0"/>
           </a:xfrm>
           <a:prstGeom prst="straightConnector1">
             <a:avLst/>
@@ -4148,155 +3883,6 @@
               <a:srgbClr val="0070C0"/>
             </a:solidFill>
             <a:tailEnd type="arrow"/>
-          </a:ln>
-        </p:spPr>
-        <p:style>
-          <a:lnRef idx="1">
-            <a:schemeClr val="accent1"/>
-          </a:lnRef>
-          <a:fillRef idx="0">
-            <a:schemeClr val="accent1"/>
-          </a:fillRef>
-          <a:effectRef idx="0">
-            <a:schemeClr val="accent1"/>
-          </a:effectRef>
-          <a:fontRef idx="minor">
-            <a:schemeClr val="tx1"/>
-          </a:fontRef>
-        </p:style>
-      </p:cxnSp>
-      <p:sp>
-        <p:nvSpPr>
-          <p:cNvPr id="19" name="Rectangle 62"/>
-          <p:cNvSpPr/>
-          <p:nvPr/>
-        </p:nvSpPr>
-        <p:spPr>
-          <a:xfrm>
-            <a:off x="3530248" y="1240654"/>
-            <a:ext cx="1650371" cy="357143"/>
-          </a:xfrm>
-          <a:prstGeom prst="rect">
-            <a:avLst/>
-          </a:prstGeom>
-          <a:solidFill>
-            <a:srgbClr val="0070C0"/>
-          </a:solidFill>
-          <a:ln w="19050">
-            <a:solidFill>
-              <a:srgbClr val="0070C0"/>
-            </a:solidFill>
-          </a:ln>
-          <a:effectLst/>
-        </p:spPr>
-        <p:style>
-          <a:lnRef idx="1">
-            <a:schemeClr val="accent2"/>
-          </a:lnRef>
-          <a:fillRef idx="2">
-            <a:schemeClr val="accent2"/>
-          </a:fillRef>
-          <a:effectRef idx="1">
-            <a:schemeClr val="accent2"/>
-          </a:effectRef>
-          <a:fontRef idx="minor">
-            <a:schemeClr val="dk1"/>
-          </a:fontRef>
-        </p:style>
-        <p:txBody>
-          <a:bodyPr rtlCol="0" anchor="ctr"/>
-          <a:lstStyle/>
-          <a:p>
-            <a:pPr algn="ctr"/>
-            <a:r>
-              <a:rPr lang="en-US" sz="1600" dirty="0">
-                <a:solidFill>
-                  <a:schemeClr val="bg1"/>
-                </a:solidFill>
-              </a:rPr>
-              <a:t>:SaveCommand</a:t>
-            </a:r>
-            <a:endParaRPr lang="en-SG" sz="1600" dirty="0">
-              <a:solidFill>
-                <a:schemeClr val="bg1"/>
-              </a:solidFill>
-            </a:endParaRPr>
-          </a:p>
-        </p:txBody>
-      </p:sp>
-      <p:cxnSp>
-        <p:nvCxnSpPr>
-          <p:cNvPr id="66" name="Straight Arrow Connector 65">
-            <a:extLst>
-              <a:ext uri="{FF2B5EF4-FFF2-40B4-BE49-F238E27FC236}">
-                <a16:creationId xmlns:a16="http://schemas.microsoft.com/office/drawing/2014/main" id="{39916E2E-195A-4DC8-B025-B05FA87E6796}"/>
-              </a:ext>
-            </a:extLst>
-          </p:cNvPr>
-          <p:cNvCxnSpPr>
-            <a:cxnSpLocks/>
-          </p:cNvCxnSpPr>
-          <p:nvPr/>
-        </p:nvCxnSpPr>
-        <p:spPr>
-          <a:xfrm>
-            <a:off x="1993612" y="2814540"/>
-            <a:ext cx="2263712" cy="1"/>
-          </a:xfrm>
-          <a:prstGeom prst="straightConnector1">
-            <a:avLst/>
-          </a:prstGeom>
-          <a:ln w="19050">
-            <a:solidFill>
-              <a:srgbClr val="0070C0"/>
-            </a:solidFill>
-            <a:tailEnd type="arrow"/>
-          </a:ln>
-        </p:spPr>
-        <p:style>
-          <a:lnRef idx="1">
-            <a:schemeClr val="accent1"/>
-          </a:lnRef>
-          <a:fillRef idx="0">
-            <a:schemeClr val="accent1"/>
-          </a:fillRef>
-          <a:effectRef idx="0">
-            <a:schemeClr val="accent1"/>
-          </a:effectRef>
-          <a:fontRef idx="minor">
-            <a:schemeClr val="tx1"/>
-          </a:fontRef>
-        </p:style>
-      </p:cxnSp>
-      <p:cxnSp>
-        <p:nvCxnSpPr>
-          <p:cNvPr id="69" name="Straight Arrow Connector 68">
-            <a:extLst>
-              <a:ext uri="{FF2B5EF4-FFF2-40B4-BE49-F238E27FC236}">
-                <a16:creationId xmlns:a16="http://schemas.microsoft.com/office/drawing/2014/main" id="{7C9F21BC-13A9-471F-825A-2621FD36355F}"/>
-              </a:ext>
-            </a:extLst>
-          </p:cNvPr>
-          <p:cNvCxnSpPr>
-            <a:cxnSpLocks/>
-          </p:cNvCxnSpPr>
-          <p:nvPr/>
-        </p:nvCxnSpPr>
-        <p:spPr>
-          <a:xfrm>
-            <a:off x="4446851" y="6245582"/>
-            <a:ext cx="1236429" cy="0"/>
-          </a:xfrm>
-          <a:prstGeom prst="straightConnector1">
-            <a:avLst/>
-          </a:prstGeom>
-          <a:ln w="19050">
-            <a:solidFill>
-              <a:srgbClr val="0070C0"/>
-            </a:solidFill>
-            <a:prstDash val="sysDash"/>
-            <a:headEnd type="arrow" w="med" len="med"/>
-            <a:tailEnd type="none" w="med" len="med"/>
           </a:ln>
         </p:spPr>
         <p:style>
@@ -4413,92 +3999,6 @@
       </p:sp>
       <p:sp>
         <p:nvSpPr>
-          <p:cNvPr id="65" name="Rectangle 64"/>
-          <p:cNvSpPr/>
-          <p:nvPr/>
-        </p:nvSpPr>
-        <p:spPr>
-          <a:xfrm>
-            <a:off x="4244411" y="2814540"/>
-            <a:ext cx="193342" cy="3584051"/>
-          </a:xfrm>
-          <a:prstGeom prst="rect">
-            <a:avLst/>
-          </a:prstGeom>
-          <a:solidFill>
-            <a:srgbClr val="0070C0"/>
-          </a:solidFill>
-          <a:ln>
-            <a:solidFill>
-              <a:srgbClr val="0070C0"/>
-            </a:solidFill>
-          </a:ln>
-          <a:effectLst/>
-        </p:spPr>
-        <p:style>
-          <a:lnRef idx="1">
-            <a:schemeClr val="accent3"/>
-          </a:lnRef>
-          <a:fillRef idx="2">
-            <a:schemeClr val="accent3"/>
-          </a:fillRef>
-          <a:effectRef idx="1">
-            <a:schemeClr val="accent3"/>
-          </a:effectRef>
-          <a:fontRef idx="minor">
-            <a:schemeClr val="dk1"/>
-          </a:fontRef>
-        </p:style>
-        <p:txBody>
-          <a:bodyPr rtlCol="0" anchor="ctr"/>
-          <a:lstStyle/>
-          <a:p>
-            <a:pPr algn="ctr"/>
-            <a:endParaRPr lang="en-SG" sz="1400"/>
-          </a:p>
-        </p:txBody>
-      </p:sp>
-      <p:sp>
-        <p:nvSpPr>
-          <p:cNvPr id="94" name="TextBox 93">
-            <a:extLst>
-              <a:ext uri="{FF2B5EF4-FFF2-40B4-BE49-F238E27FC236}">
-                <a16:creationId xmlns:a16="http://schemas.microsoft.com/office/drawing/2014/main" id="{BBF0726A-3E70-488A-9417-D9F80DCD7B1A}"/>
-              </a:ext>
-            </a:extLst>
-          </p:cNvPr>
-          <p:cNvSpPr txBox="1"/>
-          <p:nvPr/>
-        </p:nvSpPr>
-        <p:spPr>
-          <a:xfrm>
-            <a:off x="4188449" y="6416099"/>
-            <a:ext cx="258402" cy="261482"/>
-          </a:xfrm>
-          <a:prstGeom prst="rect">
-            <a:avLst/>
-          </a:prstGeom>
-          <a:noFill/>
-        </p:spPr>
-        <p:txBody>
-          <a:bodyPr wrap="square" rtlCol="0">
-            <a:spAutoFit/>
-          </a:bodyPr>
-          <a:lstStyle/>
-          <a:p>
-            <a:r>
-              <a:rPr lang="en-SG" sz="1099" dirty="0">
-                <a:solidFill>
-                  <a:srgbClr val="002060"/>
-                </a:solidFill>
-              </a:rPr>
-              <a:t>X</a:t>
-            </a:r>
-          </a:p>
-        </p:txBody>
-      </p:sp>
-      <p:sp>
-        <p:nvSpPr>
           <p:cNvPr id="112" name="TextBox 111">
             <a:extLst>
               <a:ext uri="{FF2B5EF4-FFF2-40B4-BE49-F238E27FC236}">
@@ -4635,280 +4135,6 @@
           </a:fontRef>
         </p:style>
       </p:cxnSp>
-      <p:grpSp>
-        <p:nvGrpSpPr>
-          <p:cNvPr id="223" name="Group 222">
-            <a:extLst>
-              <a:ext uri="{FF2B5EF4-FFF2-40B4-BE49-F238E27FC236}">
-                <a16:creationId xmlns:a16="http://schemas.microsoft.com/office/drawing/2014/main" id="{C73986C8-5449-4072-9F0F-17A38AD97EF5}"/>
-              </a:ext>
-            </a:extLst>
-          </p:cNvPr>
-          <p:cNvGrpSpPr/>
-          <p:nvPr/>
-        </p:nvGrpSpPr>
-        <p:grpSpPr>
-          <a:xfrm>
-            <a:off x="4317482" y="5527030"/>
-            <a:ext cx="2098168" cy="1045533"/>
-            <a:chOff x="13876547" y="5116008"/>
-            <a:chExt cx="2098168" cy="1045533"/>
-          </a:xfrm>
-        </p:grpSpPr>
-        <p:sp>
-          <p:nvSpPr>
-            <p:cNvPr id="213" name="Rectangle 62">
-              <a:extLst>
-                <a:ext uri="{FF2B5EF4-FFF2-40B4-BE49-F238E27FC236}">
-                  <a16:creationId xmlns:a16="http://schemas.microsoft.com/office/drawing/2014/main" id="{199F746E-405B-485A-994E-C0C45F8824D7}"/>
-                </a:ext>
-              </a:extLst>
-            </p:cNvPr>
-            <p:cNvSpPr/>
-            <p:nvPr/>
-          </p:nvSpPr>
-          <p:spPr>
-            <a:xfrm>
-              <a:off x="14339611" y="5331132"/>
-              <a:ext cx="1635104" cy="308233"/>
-            </a:xfrm>
-            <a:prstGeom prst="rect">
-              <a:avLst/>
-            </a:prstGeom>
-            <a:solidFill>
-              <a:srgbClr val="0070C0"/>
-            </a:solidFill>
-            <a:ln w="19050">
-              <a:solidFill>
-                <a:srgbClr val="0070C0"/>
-              </a:solidFill>
-            </a:ln>
-            <a:effectLst/>
-          </p:spPr>
-          <p:style>
-            <a:lnRef idx="1">
-              <a:schemeClr val="accent2"/>
-            </a:lnRef>
-            <a:fillRef idx="2">
-              <a:schemeClr val="accent2"/>
-            </a:fillRef>
-            <a:effectRef idx="1">
-              <a:schemeClr val="accent2"/>
-            </a:effectRef>
-            <a:fontRef idx="minor">
-              <a:schemeClr val="dk1"/>
-            </a:fontRef>
-          </p:style>
-          <p:txBody>
-            <a:bodyPr rtlCol="0" anchor="ctr"/>
-            <a:lstStyle/>
-            <a:p>
-              <a:pPr algn="ctr"/>
-              <a:r>
-                <a:rPr lang="en-US" sz="1600" dirty="0">
-                  <a:solidFill>
-                    <a:schemeClr val="bg1"/>
-                  </a:solidFill>
-                </a:rPr>
-                <a:t>:CommandResult</a:t>
-              </a:r>
-              <a:endParaRPr lang="en-SG" sz="1600" dirty="0">
-                <a:solidFill>
-                  <a:schemeClr val="bg1"/>
-                </a:solidFill>
-              </a:endParaRPr>
-            </a:p>
-          </p:txBody>
-        </p:sp>
-        <p:sp>
-          <p:nvSpPr>
-            <p:cNvPr id="214" name="Rectangle 213">
-              <a:extLst>
-                <a:ext uri="{FF2B5EF4-FFF2-40B4-BE49-F238E27FC236}">
-                  <a16:creationId xmlns:a16="http://schemas.microsoft.com/office/drawing/2014/main" id="{22493782-DEC3-436C-AC2C-EE03A965A6F0}"/>
-                </a:ext>
-              </a:extLst>
-            </p:cNvPr>
-            <p:cNvSpPr/>
-            <p:nvPr/>
-          </p:nvSpPr>
-          <p:spPr>
-            <a:xfrm>
-              <a:off x="15061109" y="5617651"/>
-              <a:ext cx="212001" cy="233401"/>
-            </a:xfrm>
-            <a:prstGeom prst="rect">
-              <a:avLst/>
-            </a:prstGeom>
-            <a:solidFill>
-              <a:srgbClr val="0070C0"/>
-            </a:solidFill>
-            <a:ln>
-              <a:solidFill>
-                <a:srgbClr val="0070C0"/>
-              </a:solidFill>
-            </a:ln>
-            <a:effectLst/>
-          </p:spPr>
-          <p:style>
-            <a:lnRef idx="1">
-              <a:schemeClr val="accent3"/>
-            </a:lnRef>
-            <a:fillRef idx="2">
-              <a:schemeClr val="accent3"/>
-            </a:fillRef>
-            <a:effectRef idx="1">
-              <a:schemeClr val="accent3"/>
-            </a:effectRef>
-            <a:fontRef idx="minor">
-              <a:schemeClr val="dk1"/>
-            </a:fontRef>
-          </p:style>
-          <p:txBody>
-            <a:bodyPr rtlCol="0" anchor="ctr"/>
-            <a:lstStyle/>
-            <a:p>
-              <a:pPr algn="ctr"/>
-              <a:endParaRPr lang="en-SG" sz="1400" dirty="0"/>
-            </a:p>
-          </p:txBody>
-        </p:sp>
-        <p:cxnSp>
-          <p:nvCxnSpPr>
-            <p:cNvPr id="215" name="Straight Connector 214">
-              <a:extLst>
-                <a:ext uri="{FF2B5EF4-FFF2-40B4-BE49-F238E27FC236}">
-                  <a16:creationId xmlns:a16="http://schemas.microsoft.com/office/drawing/2014/main" id="{0963EC8C-EF55-4B35-820F-72F93A5056C6}"/>
-                </a:ext>
-              </a:extLst>
-            </p:cNvPr>
-            <p:cNvCxnSpPr>
-              <a:cxnSpLocks/>
-            </p:cNvCxnSpPr>
-            <p:nvPr/>
-          </p:nvCxnSpPr>
-          <p:spPr>
-            <a:xfrm flipV="1">
-              <a:off x="13876547" y="5116008"/>
-              <a:ext cx="45032" cy="1045533"/>
-            </a:xfrm>
-            <a:prstGeom prst="line">
-              <a:avLst/>
-            </a:prstGeom>
-            <a:ln w="19050">
-              <a:solidFill>
-                <a:srgbClr val="0070C0"/>
-              </a:solidFill>
-              <a:prstDash val="sysDash"/>
-            </a:ln>
-            <a:effectLst/>
-          </p:spPr>
-          <p:style>
-            <a:lnRef idx="1">
-              <a:schemeClr val="accent1"/>
-            </a:lnRef>
-            <a:fillRef idx="2">
-              <a:schemeClr val="accent1"/>
-            </a:fillRef>
-            <a:effectRef idx="1">
-              <a:schemeClr val="accent1"/>
-            </a:effectRef>
-            <a:fontRef idx="minor">
-              <a:schemeClr val="dk1"/>
-            </a:fontRef>
-          </p:style>
-        </p:cxnSp>
-      </p:grpSp>
-      <p:cxnSp>
-        <p:nvCxnSpPr>
-          <p:cNvPr id="229" name="Straight Arrow Connector 228">
-            <a:extLst>
-              <a:ext uri="{FF2B5EF4-FFF2-40B4-BE49-F238E27FC236}">
-                <a16:creationId xmlns:a16="http://schemas.microsoft.com/office/drawing/2014/main" id="{674D795D-BE64-4C23-AB6B-8581B1948790}"/>
-              </a:ext>
-            </a:extLst>
-          </p:cNvPr>
-          <p:cNvCxnSpPr>
-            <a:cxnSpLocks/>
-          </p:cNvCxnSpPr>
-          <p:nvPr/>
-        </p:nvCxnSpPr>
-        <p:spPr>
-          <a:xfrm>
-            <a:off x="4406704" y="5863603"/>
-            <a:ext cx="389487" cy="0"/>
-          </a:xfrm>
-          <a:prstGeom prst="straightConnector1">
-            <a:avLst/>
-          </a:prstGeom>
-          <a:ln w="19050">
-            <a:solidFill>
-              <a:srgbClr val="0070C0"/>
-            </a:solidFill>
-            <a:tailEnd type="arrow"/>
-          </a:ln>
-        </p:spPr>
-        <p:style>
-          <a:lnRef idx="1">
-            <a:schemeClr val="accent1"/>
-          </a:lnRef>
-          <a:fillRef idx="0">
-            <a:schemeClr val="accent1"/>
-          </a:fillRef>
-          <a:effectRef idx="0">
-            <a:schemeClr val="accent1"/>
-          </a:effectRef>
-          <a:fontRef idx="minor">
-            <a:schemeClr val="tx1"/>
-          </a:fontRef>
-        </p:style>
-      </p:cxnSp>
-      <p:cxnSp>
-        <p:nvCxnSpPr>
-          <p:cNvPr id="232" name="Straight Arrow Connector 231">
-            <a:extLst>
-              <a:ext uri="{FF2B5EF4-FFF2-40B4-BE49-F238E27FC236}">
-                <a16:creationId xmlns:a16="http://schemas.microsoft.com/office/drawing/2014/main" id="{1A83AB1C-BE26-4F1A-8576-7ACE7FC365C2}"/>
-              </a:ext>
-            </a:extLst>
-          </p:cNvPr>
-          <p:cNvCxnSpPr>
-            <a:cxnSpLocks/>
-          </p:cNvCxnSpPr>
-          <p:nvPr/>
-        </p:nvCxnSpPr>
-        <p:spPr>
-          <a:xfrm flipV="1">
-            <a:off x="1972592" y="6398591"/>
-            <a:ext cx="2332563" cy="5353"/>
-          </a:xfrm>
-          <a:prstGeom prst="straightConnector1">
-            <a:avLst/>
-          </a:prstGeom>
-          <a:ln w="19050">
-            <a:solidFill>
-              <a:srgbClr val="0070C0"/>
-            </a:solidFill>
-            <a:prstDash val="sysDash"/>
-            <a:headEnd type="arrow" w="med" len="med"/>
-            <a:tailEnd type="none" w="med" len="med"/>
-          </a:ln>
-        </p:spPr>
-        <p:style>
-          <a:lnRef idx="1">
-            <a:schemeClr val="accent1"/>
-          </a:lnRef>
-          <a:fillRef idx="0">
-            <a:schemeClr val="accent1"/>
-          </a:fillRef>
-          <a:effectRef idx="0">
-            <a:schemeClr val="accent1"/>
-          </a:effectRef>
-          <a:fontRef idx="minor">
-            <a:schemeClr val="tx1"/>
-          </a:fontRef>
-        </p:style>
-      </p:cxnSp>
       <p:cxnSp>
         <p:nvCxnSpPr>
           <p:cNvPr id="250" name="Straight Arrow Connector 249">
@@ -5106,56 +4332,6 @@
           <a:p>
             <a:pPr algn="ctr"/>
             <a:endParaRPr lang="en-SG" sz="1400"/>
-          </a:p>
-        </p:txBody>
-      </p:sp>
-      <p:sp>
-        <p:nvSpPr>
-          <p:cNvPr id="57" name="TextBox 56">
-            <a:extLst>
-              <a:ext uri="{FF2B5EF4-FFF2-40B4-BE49-F238E27FC236}">
-                <a16:creationId xmlns:a16="http://schemas.microsoft.com/office/drawing/2014/main" id="{9035A39A-9E3F-4E0E-91BC-A78847CC8648}"/>
-              </a:ext>
-            </a:extLst>
-          </p:cNvPr>
-          <p:cNvSpPr txBox="1"/>
-          <p:nvPr/>
-        </p:nvSpPr>
-        <p:spPr>
-          <a:xfrm>
-            <a:off x="1511945" y="1172267"/>
-            <a:ext cx="1899551" cy="215444"/>
-          </a:xfrm>
-          <a:prstGeom prst="rect">
-            <a:avLst/>
-          </a:prstGeom>
-          <a:noFill/>
-        </p:spPr>
-        <p:txBody>
-          <a:bodyPr wrap="square" lIns="0" tIns="0" rIns="0" bIns="0" rtlCol="0">
-            <a:spAutoFit/>
-          </a:bodyPr>
-          <a:lstStyle>
-            <a:defPPr>
-              <a:defRPr lang="en-US"/>
-            </a:defPPr>
-            <a:lvl1pPr algn="r">
-              <a:defRPr sz="1400">
-                <a:solidFill>
-                  <a:srgbClr val="0070C0"/>
-                </a:solidFill>
-              </a:defRPr>
-            </a:lvl1pPr>
-          </a:lstStyle>
-          <a:p>
-            <a:r>
-              <a:rPr lang="en-US" dirty="0" err="1"/>
-              <a:t>saveCommand</a:t>
-            </a:r>
-            <a:r>
-              <a:rPr lang="en-US" dirty="0"/>
-              <a:t>()</a:t>
-            </a:r>
           </a:p>
         </p:txBody>
       </p:sp>

</xml_diff>